<commit_message>
Added the rtsp forward diagram.
</commit_message>
<xml_diff>
--- a/doc/camEcho.pptx
+++ b/doc/camEcho.pptx
@@ -9,6 +9,7 @@
     <p:sldId id="262" r:id="rId3"/>
     <p:sldId id="260" r:id="rId4"/>
     <p:sldId id="261" r:id="rId5"/>
+    <p:sldId id="263" r:id="rId6"/>
   </p:sldIdLst>
   <p:sldSz cx="12192000" cy="6858000"/>
   <p:notesSz cx="6858000" cy="9144000"/>
@@ -107,6 +108,11 @@
       </a:defRPr>
     </a:lvl9pPr>
   </p:defaultTextStyle>
+  <p:extLst>
+    <p:ext uri="{EFAFB233-063F-42B5-8137-9DF3F51BA10A}">
+      <p15:sldGuideLst xmlns:p15="http://schemas.microsoft.com/office/powerpoint/2012/main"/>
+    </p:ext>
+  </p:extLst>
 </p:presentation>
 </file>
 
@@ -259,7 +265,7 @@
           <a:p>
             <a:fld id="{C96ABD79-BEB1-4507-AF98-820D91C64A52}" type="datetimeFigureOut">
               <a:rPr lang="en-SG" smtClean="0"/>
-              <a:t>10/3/2021</a:t>
+              <a:t>2/11/2021</a:t>
             </a:fld>
             <a:endParaRPr lang="en-SG"/>
           </a:p>
@@ -459,7 +465,7 @@
           <a:p>
             <a:fld id="{C96ABD79-BEB1-4507-AF98-820D91C64A52}" type="datetimeFigureOut">
               <a:rPr lang="en-SG" smtClean="0"/>
-              <a:t>10/3/2021</a:t>
+              <a:t>2/11/2021</a:t>
             </a:fld>
             <a:endParaRPr lang="en-SG"/>
           </a:p>
@@ -669,7 +675,7 @@
           <a:p>
             <a:fld id="{C96ABD79-BEB1-4507-AF98-820D91C64A52}" type="datetimeFigureOut">
               <a:rPr lang="en-SG" smtClean="0"/>
-              <a:t>10/3/2021</a:t>
+              <a:t>2/11/2021</a:t>
             </a:fld>
             <a:endParaRPr lang="en-SG"/>
           </a:p>
@@ -869,7 +875,7 @@
           <a:p>
             <a:fld id="{C96ABD79-BEB1-4507-AF98-820D91C64A52}" type="datetimeFigureOut">
               <a:rPr lang="en-SG" smtClean="0"/>
-              <a:t>10/3/2021</a:t>
+              <a:t>2/11/2021</a:t>
             </a:fld>
             <a:endParaRPr lang="en-SG"/>
           </a:p>
@@ -1145,7 +1151,7 @@
           <a:p>
             <a:fld id="{C96ABD79-BEB1-4507-AF98-820D91C64A52}" type="datetimeFigureOut">
               <a:rPr lang="en-SG" smtClean="0"/>
-              <a:t>10/3/2021</a:t>
+              <a:t>2/11/2021</a:t>
             </a:fld>
             <a:endParaRPr lang="en-SG"/>
           </a:p>
@@ -1413,7 +1419,7 @@
           <a:p>
             <a:fld id="{C96ABD79-BEB1-4507-AF98-820D91C64A52}" type="datetimeFigureOut">
               <a:rPr lang="en-SG" smtClean="0"/>
-              <a:t>10/3/2021</a:t>
+              <a:t>2/11/2021</a:t>
             </a:fld>
             <a:endParaRPr lang="en-SG"/>
           </a:p>
@@ -1828,7 +1834,7 @@
           <a:p>
             <a:fld id="{C96ABD79-BEB1-4507-AF98-820D91C64A52}" type="datetimeFigureOut">
               <a:rPr lang="en-SG" smtClean="0"/>
-              <a:t>10/3/2021</a:t>
+              <a:t>2/11/2021</a:t>
             </a:fld>
             <a:endParaRPr lang="en-SG"/>
           </a:p>
@@ -1970,7 +1976,7 @@
           <a:p>
             <a:fld id="{C96ABD79-BEB1-4507-AF98-820D91C64A52}" type="datetimeFigureOut">
               <a:rPr lang="en-SG" smtClean="0"/>
-              <a:t>10/3/2021</a:t>
+              <a:t>2/11/2021</a:t>
             </a:fld>
             <a:endParaRPr lang="en-SG"/>
           </a:p>
@@ -2083,7 +2089,7 @@
           <a:p>
             <a:fld id="{C96ABD79-BEB1-4507-AF98-820D91C64A52}" type="datetimeFigureOut">
               <a:rPr lang="en-SG" smtClean="0"/>
-              <a:t>10/3/2021</a:t>
+              <a:t>2/11/2021</a:t>
             </a:fld>
             <a:endParaRPr lang="en-SG"/>
           </a:p>
@@ -2396,7 +2402,7 @@
           <a:p>
             <a:fld id="{C96ABD79-BEB1-4507-AF98-820D91C64A52}" type="datetimeFigureOut">
               <a:rPr lang="en-SG" smtClean="0"/>
-              <a:t>10/3/2021</a:t>
+              <a:t>2/11/2021</a:t>
             </a:fld>
             <a:endParaRPr lang="en-SG"/>
           </a:p>
@@ -2685,7 +2691,7 @@
           <a:p>
             <a:fld id="{C96ABD79-BEB1-4507-AF98-820D91C64A52}" type="datetimeFigureOut">
               <a:rPr lang="en-SG" smtClean="0"/>
-              <a:t>10/3/2021</a:t>
+              <a:t>2/11/2021</a:t>
             </a:fld>
             <a:endParaRPr lang="en-SG"/>
           </a:p>
@@ -2928,7 +2934,7 @@
           <a:p>
             <a:fld id="{C96ABD79-BEB1-4507-AF98-820D91C64A52}" type="datetimeFigureOut">
               <a:rPr lang="en-SG" smtClean="0"/>
-              <a:t>10/3/2021</a:t>
+              <a:t>2/11/2021</a:t>
             </a:fld>
             <a:endParaRPr lang="en-SG"/>
           </a:p>
@@ -4155,6 +4161,609 @@
 </p:sld>
 </file>
 
+<file path=ppt/slides/slide5.xml><?xml version="1.0" encoding="utf-8"?>
+<p:sld xmlns:a="http://schemas.openxmlformats.org/drawingml/2006/main" xmlns:r="http://schemas.openxmlformats.org/officeDocument/2006/relationships" xmlns:p="http://schemas.openxmlformats.org/presentationml/2006/main">
+  <p:cSld>
+    <p:spTree>
+      <p:nvGrpSpPr>
+        <p:cNvPr id="1" name=""/>
+        <p:cNvGrpSpPr/>
+        <p:nvPr/>
+      </p:nvGrpSpPr>
+      <p:grpSpPr>
+        <a:xfrm>
+          <a:off x="0" y="0"/>
+          <a:ext cx="0" cy="0"/>
+          <a:chOff x="0" y="0"/>
+          <a:chExt cx="0" cy="0"/>
+        </a:xfrm>
+      </p:grpSpPr>
+      <p:sp>
+        <p:nvSpPr>
+          <p:cNvPr id="11" name="Rectangle 10">
+            <a:extLst>
+              <a:ext uri="{FF2B5EF4-FFF2-40B4-BE49-F238E27FC236}">
+                <a16:creationId xmlns:a16="http://schemas.microsoft.com/office/drawing/2014/main" id="{71E191DF-C754-43CB-A7D2-643EB7993DD7}"/>
+              </a:ext>
+            </a:extLst>
+          </p:cNvPr>
+          <p:cNvSpPr/>
+          <p:nvPr/>
+        </p:nvSpPr>
+        <p:spPr>
+          <a:xfrm>
+            <a:off x="2397511" y="4718306"/>
+            <a:ext cx="4059045" cy="1236445"/>
+          </a:xfrm>
+          <a:prstGeom prst="rect">
+            <a:avLst/>
+          </a:prstGeom>
+        </p:spPr>
+        <p:style>
+          <a:lnRef idx="2">
+            <a:schemeClr val="accent6"/>
+          </a:lnRef>
+          <a:fillRef idx="1">
+            <a:schemeClr val="lt1"/>
+          </a:fillRef>
+          <a:effectRef idx="0">
+            <a:schemeClr val="accent6"/>
+          </a:effectRef>
+          <a:fontRef idx="minor">
+            <a:schemeClr val="dk1"/>
+          </a:fontRef>
+        </p:style>
+        <p:txBody>
+          <a:bodyPr rtlCol="0" anchor="ctr"/>
+          <a:lstStyle/>
+          <a:p>
+            <a:pPr algn="ctr"/>
+            <a:endParaRPr lang="en-SG"/>
+          </a:p>
+        </p:txBody>
+      </p:sp>
+      <p:cxnSp>
+        <p:nvCxnSpPr>
+          <p:cNvPr id="8" name="Straight Arrow Connector 7">
+            <a:extLst>
+              <a:ext uri="{FF2B5EF4-FFF2-40B4-BE49-F238E27FC236}">
+                <a16:creationId xmlns:a16="http://schemas.microsoft.com/office/drawing/2014/main" id="{C414F4A8-932E-4813-AFDA-B6AFE9C99F4B}"/>
+              </a:ext>
+            </a:extLst>
+          </p:cNvPr>
+          <p:cNvCxnSpPr>
+            <a:cxnSpLocks/>
+            <a:stCxn id="4" idx="2"/>
+          </p:cNvCxnSpPr>
+          <p:nvPr/>
+        </p:nvCxnSpPr>
+        <p:spPr>
+          <a:xfrm flipH="1">
+            <a:off x="3172520" y="1393902"/>
+            <a:ext cx="2" cy="2386361"/>
+          </a:xfrm>
+          <a:prstGeom prst="straightConnector1">
+            <a:avLst/>
+          </a:prstGeom>
+          <a:ln w="28575">
+            <a:headEnd type="triangle"/>
+            <a:tailEnd type="triangle"/>
+          </a:ln>
+        </p:spPr>
+        <p:style>
+          <a:lnRef idx="1">
+            <a:schemeClr val="accent1"/>
+          </a:lnRef>
+          <a:fillRef idx="0">
+            <a:schemeClr val="accent1"/>
+          </a:fillRef>
+          <a:effectRef idx="0">
+            <a:schemeClr val="accent1"/>
+          </a:effectRef>
+          <a:fontRef idx="minor">
+            <a:schemeClr val="tx1"/>
+          </a:fontRef>
+        </p:style>
+      </p:cxnSp>
+      <p:sp>
+        <p:nvSpPr>
+          <p:cNvPr id="4" name="Rectangle 3">
+            <a:extLst>
+              <a:ext uri="{FF2B5EF4-FFF2-40B4-BE49-F238E27FC236}">
+                <a16:creationId xmlns:a16="http://schemas.microsoft.com/office/drawing/2014/main" id="{B2F8BCFD-BFBF-43B8-90A3-EA555D9002B1}"/>
+              </a:ext>
+            </a:extLst>
+          </p:cNvPr>
+          <p:cNvSpPr/>
+          <p:nvPr/>
+        </p:nvSpPr>
+        <p:spPr>
+          <a:xfrm>
+            <a:off x="2352907" y="903248"/>
+            <a:ext cx="1639229" cy="490654"/>
+          </a:xfrm>
+          <a:prstGeom prst="rect">
+            <a:avLst/>
+          </a:prstGeom>
+        </p:spPr>
+        <p:style>
+          <a:lnRef idx="2">
+            <a:schemeClr val="accent1">
+              <a:shade val="50000"/>
+            </a:schemeClr>
+          </a:lnRef>
+          <a:fillRef idx="1">
+            <a:schemeClr val="accent1"/>
+          </a:fillRef>
+          <a:effectRef idx="0">
+            <a:schemeClr val="accent1"/>
+          </a:effectRef>
+          <a:fontRef idx="minor">
+            <a:schemeClr val="lt1"/>
+          </a:fontRef>
+        </p:style>
+        <p:txBody>
+          <a:bodyPr rtlCol="0" anchor="ctr"/>
+          <a:lstStyle/>
+          <a:p>
+            <a:pPr algn="ctr"/>
+            <a:r>
+              <a:rPr lang="en-SG" dirty="0"/>
+              <a:t>RTSP server A</a:t>
+            </a:r>
+          </a:p>
+        </p:txBody>
+      </p:sp>
+      <p:sp>
+        <p:nvSpPr>
+          <p:cNvPr id="5" name="Cloud 4">
+            <a:extLst>
+              <a:ext uri="{FF2B5EF4-FFF2-40B4-BE49-F238E27FC236}">
+                <a16:creationId xmlns:a16="http://schemas.microsoft.com/office/drawing/2014/main" id="{7628039C-40D8-4997-B448-F8DB57B58FA8}"/>
+              </a:ext>
+            </a:extLst>
+          </p:cNvPr>
+          <p:cNvSpPr/>
+          <p:nvPr/>
+        </p:nvSpPr>
+        <p:spPr>
+          <a:xfrm>
+            <a:off x="1918008" y="1931949"/>
+            <a:ext cx="2509025" cy="998034"/>
+          </a:xfrm>
+          <a:prstGeom prst="cloud">
+            <a:avLst/>
+          </a:prstGeom>
+          <a:noFill/>
+        </p:spPr>
+        <p:style>
+          <a:lnRef idx="2">
+            <a:schemeClr val="accent1">
+              <a:shade val="50000"/>
+            </a:schemeClr>
+          </a:lnRef>
+          <a:fillRef idx="1">
+            <a:schemeClr val="accent1"/>
+          </a:fillRef>
+          <a:effectRef idx="0">
+            <a:schemeClr val="accent1"/>
+          </a:effectRef>
+          <a:fontRef idx="minor">
+            <a:schemeClr val="lt1"/>
+          </a:fontRef>
+        </p:style>
+        <p:txBody>
+          <a:bodyPr rtlCol="0" anchor="ctr"/>
+          <a:lstStyle/>
+          <a:p>
+            <a:pPr algn="ctr"/>
+            <a:endParaRPr lang="en-SG"/>
+          </a:p>
+        </p:txBody>
+      </p:sp>
+      <p:sp>
+        <p:nvSpPr>
+          <p:cNvPr id="6" name="TextBox 5">
+            <a:extLst>
+              <a:ext uri="{FF2B5EF4-FFF2-40B4-BE49-F238E27FC236}">
+                <a16:creationId xmlns:a16="http://schemas.microsoft.com/office/drawing/2014/main" id="{91AB21A2-F79A-460D-9E1B-1B72245CA6F8}"/>
+              </a:ext>
+            </a:extLst>
+          </p:cNvPr>
+          <p:cNvSpPr txBox="1"/>
+          <p:nvPr/>
+        </p:nvSpPr>
+        <p:spPr>
+          <a:xfrm>
+            <a:off x="2609384" y="2207941"/>
+            <a:ext cx="1427356" cy="369332"/>
+          </a:xfrm>
+          <a:prstGeom prst="rect">
+            <a:avLst/>
+          </a:prstGeom>
+          <a:noFill/>
+        </p:spPr>
+        <p:txBody>
+          <a:bodyPr wrap="square" rtlCol="0">
+            <a:spAutoFit/>
+          </a:bodyPr>
+          <a:lstStyle/>
+          <a:p>
+            <a:r>
+              <a:rPr lang="en-SG" dirty="0"/>
+              <a:t>Internet</a:t>
+            </a:r>
+          </a:p>
+        </p:txBody>
+      </p:sp>
+      <p:sp>
+        <p:nvSpPr>
+          <p:cNvPr id="10" name="Rectangle 9">
+            <a:extLst>
+              <a:ext uri="{FF2B5EF4-FFF2-40B4-BE49-F238E27FC236}">
+                <a16:creationId xmlns:a16="http://schemas.microsoft.com/office/drawing/2014/main" id="{DFF3542E-6C90-4D54-8998-6762B93CEB58}"/>
+              </a:ext>
+            </a:extLst>
+          </p:cNvPr>
+          <p:cNvSpPr/>
+          <p:nvPr/>
+        </p:nvSpPr>
+        <p:spPr>
+          <a:xfrm>
+            <a:off x="2397511" y="3810928"/>
+            <a:ext cx="1639229" cy="490654"/>
+          </a:xfrm>
+          <a:prstGeom prst="rect">
+            <a:avLst/>
+          </a:prstGeom>
+        </p:spPr>
+        <p:style>
+          <a:lnRef idx="2">
+            <a:schemeClr val="accent1">
+              <a:shade val="50000"/>
+            </a:schemeClr>
+          </a:lnRef>
+          <a:fillRef idx="1">
+            <a:schemeClr val="accent1"/>
+          </a:fillRef>
+          <a:effectRef idx="0">
+            <a:schemeClr val="accent1"/>
+          </a:effectRef>
+          <a:fontRef idx="minor">
+            <a:schemeClr val="lt1"/>
+          </a:fontRef>
+        </p:style>
+        <p:txBody>
+          <a:bodyPr rtlCol="0" anchor="ctr"/>
+          <a:lstStyle/>
+          <a:p>
+            <a:pPr algn="ctr"/>
+            <a:r>
+              <a:rPr lang="en-SG" dirty="0"/>
+              <a:t>Server B</a:t>
+            </a:r>
+          </a:p>
+        </p:txBody>
+      </p:sp>
+      <p:cxnSp>
+        <p:nvCxnSpPr>
+          <p:cNvPr id="13" name="Straight Arrow Connector 12">
+            <a:extLst>
+              <a:ext uri="{FF2B5EF4-FFF2-40B4-BE49-F238E27FC236}">
+                <a16:creationId xmlns:a16="http://schemas.microsoft.com/office/drawing/2014/main" id="{00168B3C-28A1-463E-8012-92AAC10D716B}"/>
+              </a:ext>
+            </a:extLst>
+          </p:cNvPr>
+          <p:cNvCxnSpPr>
+            <a:cxnSpLocks/>
+          </p:cNvCxnSpPr>
+          <p:nvPr/>
+        </p:nvCxnSpPr>
+        <p:spPr>
+          <a:xfrm>
+            <a:off x="3172520" y="4301582"/>
+            <a:ext cx="0" cy="660711"/>
+          </a:xfrm>
+          <a:prstGeom prst="straightConnector1">
+            <a:avLst/>
+          </a:prstGeom>
+          <a:ln w="28575">
+            <a:headEnd type="triangle"/>
+            <a:tailEnd type="triangle"/>
+          </a:ln>
+        </p:spPr>
+        <p:style>
+          <a:lnRef idx="1">
+            <a:schemeClr val="accent1"/>
+          </a:lnRef>
+          <a:fillRef idx="0">
+            <a:schemeClr val="accent1"/>
+          </a:fillRef>
+          <a:effectRef idx="0">
+            <a:schemeClr val="accent1"/>
+          </a:effectRef>
+          <a:fontRef idx="minor">
+            <a:schemeClr val="tx1"/>
+          </a:fontRef>
+        </p:style>
+      </p:cxnSp>
+      <p:sp>
+        <p:nvSpPr>
+          <p:cNvPr id="16" name="Rectangle 15">
+            <a:extLst>
+              <a:ext uri="{FF2B5EF4-FFF2-40B4-BE49-F238E27FC236}">
+                <a16:creationId xmlns:a16="http://schemas.microsoft.com/office/drawing/2014/main" id="{D4E84541-D04F-4EF3-BEB0-143632CE90D8}"/>
+              </a:ext>
+            </a:extLst>
+          </p:cNvPr>
+          <p:cNvSpPr/>
+          <p:nvPr/>
+        </p:nvSpPr>
+        <p:spPr>
+          <a:xfrm>
+            <a:off x="2503447" y="5004109"/>
+            <a:ext cx="1639229" cy="490654"/>
+          </a:xfrm>
+          <a:prstGeom prst="rect">
+            <a:avLst/>
+          </a:prstGeom>
+        </p:spPr>
+        <p:style>
+          <a:lnRef idx="2">
+            <a:schemeClr val="accent1">
+              <a:shade val="50000"/>
+            </a:schemeClr>
+          </a:lnRef>
+          <a:fillRef idx="1">
+            <a:schemeClr val="accent1"/>
+          </a:fillRef>
+          <a:effectRef idx="0">
+            <a:schemeClr val="accent1"/>
+          </a:effectRef>
+          <a:fontRef idx="minor">
+            <a:schemeClr val="lt1"/>
+          </a:fontRef>
+        </p:style>
+        <p:txBody>
+          <a:bodyPr rtlCol="0" anchor="ctr"/>
+          <a:lstStyle/>
+          <a:p>
+            <a:pPr algn="ctr"/>
+            <a:r>
+              <a:rPr lang="en-SG" dirty="0"/>
+              <a:t>Network switch</a:t>
+            </a:r>
+          </a:p>
+        </p:txBody>
+      </p:sp>
+      <p:sp>
+        <p:nvSpPr>
+          <p:cNvPr id="17" name="Rectangle 16">
+            <a:extLst>
+              <a:ext uri="{FF2B5EF4-FFF2-40B4-BE49-F238E27FC236}">
+                <a16:creationId xmlns:a16="http://schemas.microsoft.com/office/drawing/2014/main" id="{5101686A-7711-4337-B791-357389DC251A}"/>
+              </a:ext>
+            </a:extLst>
+          </p:cNvPr>
+          <p:cNvSpPr/>
+          <p:nvPr/>
+        </p:nvSpPr>
+        <p:spPr>
+          <a:xfrm>
+            <a:off x="4917685" y="4817327"/>
+            <a:ext cx="1380894" cy="399328"/>
+          </a:xfrm>
+          <a:prstGeom prst="rect">
+            <a:avLst/>
+          </a:prstGeom>
+        </p:spPr>
+        <p:style>
+          <a:lnRef idx="2">
+            <a:schemeClr val="accent1">
+              <a:shade val="50000"/>
+            </a:schemeClr>
+          </a:lnRef>
+          <a:fillRef idx="1">
+            <a:schemeClr val="accent1"/>
+          </a:fillRef>
+          <a:effectRef idx="0">
+            <a:schemeClr val="accent1"/>
+          </a:effectRef>
+          <a:fontRef idx="minor">
+            <a:schemeClr val="lt1"/>
+          </a:fontRef>
+        </p:style>
+        <p:txBody>
+          <a:bodyPr rtlCol="0" anchor="ctr"/>
+          <a:lstStyle/>
+          <a:p>
+            <a:pPr algn="ctr"/>
+            <a:r>
+              <a:rPr lang="en-SG" dirty="0"/>
+              <a:t>Computer C</a:t>
+            </a:r>
+          </a:p>
+        </p:txBody>
+      </p:sp>
+      <p:sp>
+        <p:nvSpPr>
+          <p:cNvPr id="18" name="Rectangle 17">
+            <a:extLst>
+              <a:ext uri="{FF2B5EF4-FFF2-40B4-BE49-F238E27FC236}">
+                <a16:creationId xmlns:a16="http://schemas.microsoft.com/office/drawing/2014/main" id="{DC0763F9-2A25-4643-B8CC-2F3CC744E15A}"/>
+              </a:ext>
+            </a:extLst>
+          </p:cNvPr>
+          <p:cNvSpPr/>
+          <p:nvPr/>
+        </p:nvSpPr>
+        <p:spPr>
+          <a:xfrm>
+            <a:off x="4917685" y="5433715"/>
+            <a:ext cx="1380894" cy="399328"/>
+          </a:xfrm>
+          <a:prstGeom prst="rect">
+            <a:avLst/>
+          </a:prstGeom>
+        </p:spPr>
+        <p:style>
+          <a:lnRef idx="2">
+            <a:schemeClr val="accent1">
+              <a:shade val="50000"/>
+            </a:schemeClr>
+          </a:lnRef>
+          <a:fillRef idx="1">
+            <a:schemeClr val="accent1"/>
+          </a:fillRef>
+          <a:effectRef idx="0">
+            <a:schemeClr val="accent1"/>
+          </a:effectRef>
+          <a:fontRef idx="minor">
+            <a:schemeClr val="lt1"/>
+          </a:fontRef>
+        </p:style>
+        <p:txBody>
+          <a:bodyPr rtlCol="0" anchor="ctr"/>
+          <a:lstStyle/>
+          <a:p>
+            <a:pPr algn="ctr"/>
+            <a:r>
+              <a:rPr lang="en-SG" dirty="0"/>
+              <a:t>Computer D</a:t>
+            </a:r>
+          </a:p>
+        </p:txBody>
+      </p:sp>
+      <p:cxnSp>
+        <p:nvCxnSpPr>
+          <p:cNvPr id="20" name="Straight Arrow Connector 19">
+            <a:extLst>
+              <a:ext uri="{FF2B5EF4-FFF2-40B4-BE49-F238E27FC236}">
+                <a16:creationId xmlns:a16="http://schemas.microsoft.com/office/drawing/2014/main" id="{4075D80B-6A9E-46D3-8280-95CD643A4F6C}"/>
+              </a:ext>
+            </a:extLst>
+          </p:cNvPr>
+          <p:cNvCxnSpPr/>
+          <p:nvPr/>
+        </p:nvCxnSpPr>
+        <p:spPr>
+          <a:xfrm flipH="1">
+            <a:off x="4142676" y="5016991"/>
+            <a:ext cx="775009" cy="199664"/>
+          </a:xfrm>
+          <a:prstGeom prst="straightConnector1">
+            <a:avLst/>
+          </a:prstGeom>
+          <a:ln>
+            <a:tailEnd type="triangle"/>
+          </a:ln>
+        </p:spPr>
+        <p:style>
+          <a:lnRef idx="1">
+            <a:schemeClr val="accent1"/>
+          </a:lnRef>
+          <a:fillRef idx="0">
+            <a:schemeClr val="accent1"/>
+          </a:fillRef>
+          <a:effectRef idx="0">
+            <a:schemeClr val="accent1"/>
+          </a:effectRef>
+          <a:fontRef idx="minor">
+            <a:schemeClr val="tx1"/>
+          </a:fontRef>
+        </p:style>
+      </p:cxnSp>
+      <p:cxnSp>
+        <p:nvCxnSpPr>
+          <p:cNvPr id="21" name="Straight Arrow Connector 20">
+            <a:extLst>
+              <a:ext uri="{FF2B5EF4-FFF2-40B4-BE49-F238E27FC236}">
+                <a16:creationId xmlns:a16="http://schemas.microsoft.com/office/drawing/2014/main" id="{4A3FF12D-8819-40A4-BA71-49D02C85A8E6}"/>
+              </a:ext>
+            </a:extLst>
+          </p:cNvPr>
+          <p:cNvCxnSpPr>
+            <a:cxnSpLocks/>
+            <a:stCxn id="18" idx="1"/>
+            <a:endCxn id="16" idx="3"/>
+          </p:cNvCxnSpPr>
+          <p:nvPr/>
+        </p:nvCxnSpPr>
+        <p:spPr>
+          <a:xfrm flipH="1" flipV="1">
+            <a:off x="4142676" y="5249436"/>
+            <a:ext cx="775009" cy="383943"/>
+          </a:xfrm>
+          <a:prstGeom prst="straightConnector1">
+            <a:avLst/>
+          </a:prstGeom>
+          <a:ln>
+            <a:tailEnd type="triangle"/>
+          </a:ln>
+        </p:spPr>
+        <p:style>
+          <a:lnRef idx="1">
+            <a:schemeClr val="accent1"/>
+          </a:lnRef>
+          <a:fillRef idx="0">
+            <a:schemeClr val="accent1"/>
+          </a:fillRef>
+          <a:effectRef idx="0">
+            <a:schemeClr val="accent1"/>
+          </a:effectRef>
+          <a:fontRef idx="minor">
+            <a:schemeClr val="tx1"/>
+          </a:fontRef>
+        </p:style>
+      </p:cxnSp>
+      <p:sp>
+        <p:nvSpPr>
+          <p:cNvPr id="24" name="TextBox 23">
+            <a:extLst>
+              <a:ext uri="{FF2B5EF4-FFF2-40B4-BE49-F238E27FC236}">
+                <a16:creationId xmlns:a16="http://schemas.microsoft.com/office/drawing/2014/main" id="{7C185686-FAB6-4DFB-A718-14241BB51F48}"/>
+              </a:ext>
+            </a:extLst>
+          </p:cNvPr>
+          <p:cNvSpPr txBox="1"/>
+          <p:nvPr/>
+        </p:nvSpPr>
+        <p:spPr>
+          <a:xfrm>
+            <a:off x="2458842" y="5585419"/>
+            <a:ext cx="1577898" cy="369332"/>
+          </a:xfrm>
+          <a:prstGeom prst="rect">
+            <a:avLst/>
+          </a:prstGeom>
+          <a:noFill/>
+        </p:spPr>
+        <p:txBody>
+          <a:bodyPr wrap="square" rtlCol="0">
+            <a:spAutoFit/>
+          </a:bodyPr>
+          <a:lstStyle/>
+          <a:p>
+            <a:r>
+              <a:rPr lang="en-SG" dirty="0"/>
+              <a:t>Local network</a:t>
+            </a:r>
+          </a:p>
+        </p:txBody>
+      </p:sp>
+    </p:spTree>
+    <p:extLst>
+      <p:ext uri="{BB962C8B-B14F-4D97-AF65-F5344CB8AC3E}">
+        <p14:creationId xmlns:p14="http://schemas.microsoft.com/office/powerpoint/2010/main" val="1936737668"/>
+      </p:ext>
+    </p:extLst>
+  </p:cSld>
+  <p:clrMapOvr>
+    <a:masterClrMapping/>
+  </p:clrMapOvr>
+</p:sld>
+</file>
+
 <file path=ppt/theme/theme1.xml><?xml version="1.0" encoding="utf-8"?>
 <a:theme xmlns:a="http://schemas.openxmlformats.org/drawingml/2006/main" name="Office Theme">
   <a:themeElements>

</xml_diff>